<commit_message>
final adjustments to assignment:
</commit_message>
<xml_diff>
--- a/Assignment1_slides.pptx
+++ b/Assignment1_slides.pptx
@@ -5,8 +5,9 @@
     <p:sldMasterId id="2147483648" r:id="rId1"/>
   </p:sldMasterIdLst>
   <p:sldIdLst>
-    <p:sldId id="257" r:id="rId2"/>
-    <p:sldId id="258" r:id="rId3"/>
+    <p:sldId id="259" r:id="rId2"/>
+    <p:sldId id="257" r:id="rId3"/>
+    <p:sldId id="258" r:id="rId4"/>
   </p:sldIdLst>
   <p:sldSz cx="12192000" cy="6858000"/>
   <p:notesSz cx="6858000" cy="9144000"/>
@@ -105,6 +106,11 @@
       </a:defRPr>
     </a:lvl9pPr>
   </p:defaultTextStyle>
+  <p:extLst>
+    <p:ext uri="{EFAFB233-063F-42B5-8137-9DF3F51BA10A}">
+      <p15:sldGuideLst xmlns:p15="http://schemas.microsoft.com/office/powerpoint/2012/main"/>
+    </p:ext>
+  </p:extLst>
 </p:presentation>
 </file>
 
@@ -255,7 +261,7 @@
           <a:p>
             <a:fld id="{05A806D1-5F2D-8944-9DDA-3E5D971C5F40}" type="datetimeFigureOut">
               <a:rPr lang="en-US" smtClean="0"/>
-              <a:t>7/1/25</a:t>
+              <a:t>7/2/25</a:t>
             </a:fld>
             <a:endParaRPr lang="en-US"/>
           </a:p>
@@ -453,7 +459,7 @@
           <a:p>
             <a:fld id="{05A806D1-5F2D-8944-9DDA-3E5D971C5F40}" type="datetimeFigureOut">
               <a:rPr lang="en-US" smtClean="0"/>
-              <a:t>7/1/25</a:t>
+              <a:t>7/2/25</a:t>
             </a:fld>
             <a:endParaRPr lang="en-US"/>
           </a:p>
@@ -661,7 +667,7 @@
           <a:p>
             <a:fld id="{05A806D1-5F2D-8944-9DDA-3E5D971C5F40}" type="datetimeFigureOut">
               <a:rPr lang="en-US" smtClean="0"/>
-              <a:t>7/1/25</a:t>
+              <a:t>7/2/25</a:t>
             </a:fld>
             <a:endParaRPr lang="en-US"/>
           </a:p>
@@ -859,7 +865,7 @@
           <a:p>
             <a:fld id="{05A806D1-5F2D-8944-9DDA-3E5D971C5F40}" type="datetimeFigureOut">
               <a:rPr lang="en-US" smtClean="0"/>
-              <a:t>7/1/25</a:t>
+              <a:t>7/2/25</a:t>
             </a:fld>
             <a:endParaRPr lang="en-US"/>
           </a:p>
@@ -1134,7 +1140,7 @@
           <a:p>
             <a:fld id="{05A806D1-5F2D-8944-9DDA-3E5D971C5F40}" type="datetimeFigureOut">
               <a:rPr lang="en-US" smtClean="0"/>
-              <a:t>7/1/25</a:t>
+              <a:t>7/2/25</a:t>
             </a:fld>
             <a:endParaRPr lang="en-US"/>
           </a:p>
@@ -1399,7 +1405,7 @@
           <a:p>
             <a:fld id="{05A806D1-5F2D-8944-9DDA-3E5D971C5F40}" type="datetimeFigureOut">
               <a:rPr lang="en-US" smtClean="0"/>
-              <a:t>7/1/25</a:t>
+              <a:t>7/2/25</a:t>
             </a:fld>
             <a:endParaRPr lang="en-US"/>
           </a:p>
@@ -1811,7 +1817,7 @@
           <a:p>
             <a:fld id="{05A806D1-5F2D-8944-9DDA-3E5D971C5F40}" type="datetimeFigureOut">
               <a:rPr lang="en-US" smtClean="0"/>
-              <a:t>7/1/25</a:t>
+              <a:t>7/2/25</a:t>
             </a:fld>
             <a:endParaRPr lang="en-US"/>
           </a:p>
@@ -1952,7 +1958,7 @@
           <a:p>
             <a:fld id="{05A806D1-5F2D-8944-9DDA-3E5D971C5F40}" type="datetimeFigureOut">
               <a:rPr lang="en-US" smtClean="0"/>
-              <a:t>7/1/25</a:t>
+              <a:t>7/2/25</a:t>
             </a:fld>
             <a:endParaRPr lang="en-US"/>
           </a:p>
@@ -2065,7 +2071,7 @@
           <a:p>
             <a:fld id="{05A806D1-5F2D-8944-9DDA-3E5D971C5F40}" type="datetimeFigureOut">
               <a:rPr lang="en-US" smtClean="0"/>
-              <a:t>7/1/25</a:t>
+              <a:t>7/2/25</a:t>
             </a:fld>
             <a:endParaRPr lang="en-US"/>
           </a:p>
@@ -2376,7 +2382,7 @@
           <a:p>
             <a:fld id="{05A806D1-5F2D-8944-9DDA-3E5D971C5F40}" type="datetimeFigureOut">
               <a:rPr lang="en-US" smtClean="0"/>
-              <a:t>7/1/25</a:t>
+              <a:t>7/2/25</a:t>
             </a:fld>
             <a:endParaRPr lang="en-US"/>
           </a:p>
@@ -2664,7 +2670,7 @@
           <a:p>
             <a:fld id="{05A806D1-5F2D-8944-9DDA-3E5D971C5F40}" type="datetimeFigureOut">
               <a:rPr lang="en-US" smtClean="0"/>
-              <a:t>7/1/25</a:t>
+              <a:t>7/2/25</a:t>
             </a:fld>
             <a:endParaRPr lang="en-US"/>
           </a:p>
@@ -2905,7 +2911,7 @@
           <a:p>
             <a:fld id="{05A806D1-5F2D-8944-9DDA-3E5D971C5F40}" type="datetimeFigureOut">
               <a:rPr lang="en-US" smtClean="0"/>
-              <a:t>7/1/25</a:t>
+              <a:t>7/2/25</a:t>
             </a:fld>
             <a:endParaRPr lang="en-US"/>
           </a:p>
@@ -3327,6 +3333,105 @@
           <p:cNvPr id="2" name="Title 1">
             <a:extLst>
               <a:ext uri="{FF2B5EF4-FFF2-40B4-BE49-F238E27FC236}">
+                <a16:creationId xmlns:a16="http://schemas.microsoft.com/office/drawing/2014/main" id="{8752EDDA-9FC0-3DF8-AD7C-C4120BD1EEDB}"/>
+              </a:ext>
+            </a:extLst>
+          </p:cNvPr>
+          <p:cNvSpPr>
+            <a:spLocks noGrp="1"/>
+          </p:cNvSpPr>
+          <p:nvPr>
+            <p:ph type="title"/>
+          </p:nvPr>
+        </p:nvSpPr>
+        <p:spPr/>
+        <p:txBody>
+          <a:bodyPr/>
+          <a:lstStyle/>
+          <a:p>
+            <a:r>
+              <a:rPr lang="en-US" dirty="0" err="1"/>
+              <a:t>Github</a:t>
+            </a:r>
+            <a:r>
+              <a:rPr lang="en-US" dirty="0"/>
+              <a:t> assignment link</a:t>
+            </a:r>
+          </a:p>
+        </p:txBody>
+      </p:sp>
+      <p:sp>
+        <p:nvSpPr>
+          <p:cNvPr id="3" name="Content Placeholder 2">
+            <a:extLst>
+              <a:ext uri="{FF2B5EF4-FFF2-40B4-BE49-F238E27FC236}">
+                <a16:creationId xmlns:a16="http://schemas.microsoft.com/office/drawing/2014/main" id="{73A5DBD2-0F50-D87F-6E28-3B2EC7841717}"/>
+              </a:ext>
+            </a:extLst>
+          </p:cNvPr>
+          <p:cNvSpPr>
+            <a:spLocks noGrp="1"/>
+          </p:cNvSpPr>
+          <p:nvPr>
+            <p:ph idx="1"/>
+          </p:nvPr>
+        </p:nvSpPr>
+        <p:spPr/>
+        <p:txBody>
+          <a:bodyPr/>
+          <a:lstStyle/>
+          <a:p>
+            <a:pPr marL="0" indent="0">
+              <a:buNone/>
+            </a:pPr>
+            <a:r>
+              <a:rPr lang="en-US" dirty="0">
+                <a:hlinkClick r:id="rId2"/>
+              </a:rPr>
+              <a:t>https://github.com/ccwimmer29/data-versioning-and-dp-practice/tree/main</a:t>
+            </a:r>
+            <a:r>
+              <a:rPr lang="en-US" dirty="0"/>
+              <a:t> </a:t>
+            </a:r>
+          </a:p>
+        </p:txBody>
+      </p:sp>
+    </p:spTree>
+    <p:extLst>
+      <p:ext uri="{BB962C8B-B14F-4D97-AF65-F5344CB8AC3E}">
+        <p14:creationId xmlns:p14="http://schemas.microsoft.com/office/powerpoint/2010/main" val="1955906792"/>
+      </p:ext>
+    </p:extLst>
+  </p:cSld>
+  <p:clrMapOvr>
+    <a:masterClrMapping/>
+  </p:clrMapOvr>
+</p:sld>
+</file>
+
+<file path=ppt/slides/slide2.xml><?xml version="1.0" encoding="utf-8"?>
+<p:sld xmlns:a="http://schemas.openxmlformats.org/drawingml/2006/main" xmlns:r="http://schemas.openxmlformats.org/officeDocument/2006/relationships" xmlns:p="http://schemas.openxmlformats.org/presentationml/2006/main">
+  <p:cSld>
+    <p:spTree>
+      <p:nvGrpSpPr>
+        <p:cNvPr id="1" name=""/>
+        <p:cNvGrpSpPr/>
+        <p:nvPr/>
+      </p:nvGrpSpPr>
+      <p:grpSpPr>
+        <a:xfrm>
+          <a:off x="0" y="0"/>
+          <a:ext cx="0" cy="0"/>
+          <a:chOff x="0" y="0"/>
+          <a:chExt cx="0" cy="0"/>
+        </a:xfrm>
+      </p:grpSpPr>
+      <p:sp>
+        <p:nvSpPr>
+          <p:cNvPr id="2" name="Title 1">
+            <a:extLst>
+              <a:ext uri="{FF2B5EF4-FFF2-40B4-BE49-F238E27FC236}">
                 <a16:creationId xmlns:a16="http://schemas.microsoft.com/office/drawing/2014/main" id="{E6507EFD-2956-0804-09A7-8E9B614C1A65}"/>
               </a:ext>
             </a:extLst>
@@ -3425,7 +3530,7 @@
 </p:sld>
 </file>
 
-<file path=ppt/slides/slide2.xml><?xml version="1.0" encoding="utf-8"?>
+<file path=ppt/slides/slide3.xml><?xml version="1.0" encoding="utf-8"?>
 <p:sld xmlns:a="http://schemas.openxmlformats.org/drawingml/2006/main" xmlns:r="http://schemas.openxmlformats.org/officeDocument/2006/relationships" xmlns:p="http://schemas.openxmlformats.org/presentationml/2006/main">
   <p:cSld>
     <p:spTree>
@@ -3496,9 +3601,42 @@
         <p:spPr/>
         <p:txBody>
           <a:bodyPr>
-            <a:normAutofit/>
+            <a:normAutofit fontScale="85000" lnSpcReduction="20000"/>
           </a:bodyPr>
           <a:lstStyle/>
+          <a:p>
+            <a:pPr marL="0" indent="0">
+              <a:buNone/>
+            </a:pPr>
+            <a:r>
+              <a:rPr lang="en-US" dirty="0"/>
+              <a:t>Between </a:t>
+            </a:r>
+            <a:r>
+              <a:rPr lang="en-US" dirty="0" err="1"/>
+              <a:t>LakeFS</a:t>
+            </a:r>
+            <a:r>
+              <a:rPr lang="en-US" dirty="0"/>
+              <a:t> and DVC, I found DVC much easier to install and use. The setup process was straightforward, and I appreciated that the commands felt very similar to Git, which made the learning curve much smoother. Versioning data and switching between versions of the same model felt intuitive, and I liked that it integrated cleanly into my existing Git workflow. The familiarity made it easy to track changes and move between dataset versions without much friction.</a:t>
+            </a:r>
+          </a:p>
+          <a:p>
+            <a:pPr marL="0" indent="0">
+              <a:buNone/>
+            </a:pPr>
+            <a:r>
+              <a:rPr lang="en-US" dirty="0" err="1"/>
+              <a:t>LakeFS</a:t>
+            </a:r>
+            <a:r>
+              <a:rPr lang="en-US" dirty="0"/>
+              <a:t>, on the other hand, was a bit more challenging to get started with. The installation process was a little confusing, and it took me some time to get used to the interface and terminology. Once I got the hang of it, data versioning itself was fairly manageable, though the commands required some initial effort to learn. Switching between model versions also involved a bit of a learning curve. In terms of differential privacy (DP), I noticed that applying DP did reduce model accuracy and impacted some of the key metrics, which was expected, but it was useful to see that trade-off play out in practice.</a:t>
+            </a:r>
+          </a:p>
+          <a:p>
+            <a:endParaRPr lang="en-US" dirty="0"/>
+          </a:p>
           <a:p>
             <a:endParaRPr lang="en-US" dirty="0"/>
           </a:p>

</xml_diff>